<commit_message>
Update to Mod 3
</commit_message>
<xml_diff>
--- a/Modules/Module 0 - Course Intro/Module 0 - Intro.pptx
+++ b/Modules/Module 0 - Course Intro/Module 0 - Intro.pptx
@@ -115,16 +115,71 @@
 </p:presentation>
 </file>
 
-<file path=ppt/revisionInfo.xml><?xml version="1.0" encoding="utf-8"?>
-<p1510:revInfo xmlns:a="http://schemas.openxmlformats.org/drawingml/2006/main" xmlns:r="http://schemas.openxmlformats.org/officeDocument/2006/relationships" xmlns:p1510="http://schemas.microsoft.com/office/powerpoint/2015/10/main">
-  <p1510:revLst>
-    <p1510:client id="{F135010A-F226-44F5-BA4D-75AB3FEA5287}" v="53" dt="2018-08-15T12:15:17.523"/>
-  </p1510:revLst>
-</p1510:revInfo>
-</file>
-
 <file path=ppt/changesInfos/changesInfo1.xml><?xml version="1.0" encoding="utf-8"?>
 <pc:chgInfo xmlns:a="http://schemas.openxmlformats.org/drawingml/2006/main" xmlns:r="http://schemas.openxmlformats.org/officeDocument/2006/relationships" xmlns:ac="http://schemas.microsoft.com/office/drawing/2013/main/command" xmlns:pc="http://schemas.microsoft.com/office/powerpoint/2013/main/command">
+  <pc:docChgLst>
+    <pc:chgData name="Jim Cheshire" userId="b85fe55d-f0de-4d09-bc19-562bc869f811" providerId="ADAL" clId="{208F69A1-7D31-45C4-A75B-64AD1854116E}"/>
+    <pc:docChg chg="modSld">
+      <pc:chgData name="Jim Cheshire" userId="b85fe55d-f0de-4d09-bc19-562bc869f811" providerId="ADAL" clId="{208F69A1-7D31-45C4-A75B-64AD1854116E}" dt="2018-09-06T13:51:31.266" v="65" actId="20577"/>
+      <pc:docMkLst>
+        <pc:docMk/>
+      </pc:docMkLst>
+      <pc:sldChg chg="modSp">
+        <pc:chgData name="Jim Cheshire" userId="b85fe55d-f0de-4d09-bc19-562bc869f811" providerId="ADAL" clId="{208F69A1-7D31-45C4-A75B-64AD1854116E}" dt="2018-09-06T13:51:31.266" v="65" actId="20577"/>
+        <pc:sldMkLst>
+          <pc:docMk/>
+          <pc:sldMk cId="2390709424" sldId="256"/>
+        </pc:sldMkLst>
+        <pc:spChg chg="mod">
+          <ac:chgData name="Jim Cheshire" userId="b85fe55d-f0de-4d09-bc19-562bc869f811" providerId="ADAL" clId="{208F69A1-7D31-45C4-A75B-64AD1854116E}" dt="2018-09-06T13:51:31.266" v="65" actId="20577"/>
+          <ac:spMkLst>
+            <pc:docMk/>
+            <pc:sldMk cId="2390709424" sldId="256"/>
+            <ac:spMk id="3" creationId="{1DB2D46A-7BAC-491D-8A1F-E1F8AF9292EC}"/>
+          </ac:spMkLst>
+        </pc:spChg>
+      </pc:sldChg>
+    </pc:docChg>
+  </pc:docChgLst>
+  <pc:docChgLst>
+    <pc:chgData name="Jim Cheshire" userId="b85fe55d-f0de-4d09-bc19-562bc869f811" providerId="ADAL" clId="{F135010A-F226-44F5-BA4D-75AB3FEA5287}"/>
+    <pc:docChg chg="custSel modSld">
+      <pc:chgData name="Jim Cheshire" userId="b85fe55d-f0de-4d09-bc19-562bc869f811" providerId="ADAL" clId="{F135010A-F226-44F5-BA4D-75AB3FEA5287}" dt="2018-08-15T12:15:17.523" v="52" actId="27636"/>
+      <pc:docMkLst>
+        <pc:docMk/>
+      </pc:docMkLst>
+      <pc:sldChg chg="modSp">
+        <pc:chgData name="Jim Cheshire" userId="b85fe55d-f0de-4d09-bc19-562bc869f811" providerId="ADAL" clId="{F135010A-F226-44F5-BA4D-75AB3FEA5287}" dt="2018-08-15T12:15:17.523" v="52" actId="27636"/>
+        <pc:sldMkLst>
+          <pc:docMk/>
+          <pc:sldMk cId="375618981" sldId="257"/>
+        </pc:sldMkLst>
+        <pc:spChg chg="mod">
+          <ac:chgData name="Jim Cheshire" userId="b85fe55d-f0de-4d09-bc19-562bc869f811" providerId="ADAL" clId="{F135010A-F226-44F5-BA4D-75AB3FEA5287}" dt="2018-08-15T12:15:17.523" v="52" actId="27636"/>
+          <ac:spMkLst>
+            <pc:docMk/>
+            <pc:sldMk cId="375618981" sldId="257"/>
+            <ac:spMk id="3" creationId="{3A6D35C6-D7CF-4EC4-BC5F-C81858757EEC}"/>
+          </ac:spMkLst>
+        </pc:spChg>
+      </pc:sldChg>
+      <pc:sldChg chg="modSp">
+        <pc:chgData name="Jim Cheshire" userId="b85fe55d-f0de-4d09-bc19-562bc869f811" providerId="ADAL" clId="{F135010A-F226-44F5-BA4D-75AB3FEA5287}" dt="2018-08-15T12:14:45.706" v="34" actId="20577"/>
+        <pc:sldMkLst>
+          <pc:docMk/>
+          <pc:sldMk cId="1721978392" sldId="258"/>
+        </pc:sldMkLst>
+        <pc:spChg chg="mod">
+          <ac:chgData name="Jim Cheshire" userId="b85fe55d-f0de-4d09-bc19-562bc869f811" providerId="ADAL" clId="{F135010A-F226-44F5-BA4D-75AB3FEA5287}" dt="2018-08-15T12:14:45.706" v="34" actId="20577"/>
+          <ac:spMkLst>
+            <pc:docMk/>
+            <pc:sldMk cId="1721978392" sldId="258"/>
+            <ac:spMk id="3" creationId="{9102A9B4-46D9-4865-A76D-85392096181B}"/>
+          </ac:spMkLst>
+        </pc:spChg>
+      </pc:sldChg>
+    </pc:docChg>
+  </pc:docChgLst>
   <pc:docChgLst>
     <pc:chgData name="Jim Cheshire" userId="b85fe55d-f0de-4d09-bc19-562bc869f811" providerId="ADAL" clId="{66147217-2DC6-4226-8AF4-0E55E8BD0513}"/>
     <pc:docChg chg="custSel addSld modSld">
@@ -203,45 +258,6 @@
       </pc:sldChg>
     </pc:docChg>
   </pc:docChgLst>
-  <pc:docChgLst>
-    <pc:chgData name="Jim Cheshire" userId="b85fe55d-f0de-4d09-bc19-562bc869f811" providerId="ADAL" clId="{F135010A-F226-44F5-BA4D-75AB3FEA5287}"/>
-    <pc:docChg chg="custSel modSld">
-      <pc:chgData name="Jim Cheshire" userId="b85fe55d-f0de-4d09-bc19-562bc869f811" providerId="ADAL" clId="{F135010A-F226-44F5-BA4D-75AB3FEA5287}" dt="2018-08-15T12:15:17.523" v="52" actId="27636"/>
-      <pc:docMkLst>
-        <pc:docMk/>
-      </pc:docMkLst>
-      <pc:sldChg chg="modSp">
-        <pc:chgData name="Jim Cheshire" userId="b85fe55d-f0de-4d09-bc19-562bc869f811" providerId="ADAL" clId="{F135010A-F226-44F5-BA4D-75AB3FEA5287}" dt="2018-08-15T12:15:17.523" v="52" actId="27636"/>
-        <pc:sldMkLst>
-          <pc:docMk/>
-          <pc:sldMk cId="375618981" sldId="257"/>
-        </pc:sldMkLst>
-        <pc:spChg chg="mod">
-          <ac:chgData name="Jim Cheshire" userId="b85fe55d-f0de-4d09-bc19-562bc869f811" providerId="ADAL" clId="{F135010A-F226-44F5-BA4D-75AB3FEA5287}" dt="2018-08-15T12:15:17.523" v="52" actId="27636"/>
-          <ac:spMkLst>
-            <pc:docMk/>
-            <pc:sldMk cId="375618981" sldId="257"/>
-            <ac:spMk id="3" creationId="{3A6D35C6-D7CF-4EC4-BC5F-C81858757EEC}"/>
-          </ac:spMkLst>
-        </pc:spChg>
-      </pc:sldChg>
-      <pc:sldChg chg="modSp">
-        <pc:chgData name="Jim Cheshire" userId="b85fe55d-f0de-4d09-bc19-562bc869f811" providerId="ADAL" clId="{F135010A-F226-44F5-BA4D-75AB3FEA5287}" dt="2018-08-15T12:14:45.706" v="34" actId="20577"/>
-        <pc:sldMkLst>
-          <pc:docMk/>
-          <pc:sldMk cId="1721978392" sldId="258"/>
-        </pc:sldMkLst>
-        <pc:spChg chg="mod">
-          <ac:chgData name="Jim Cheshire" userId="b85fe55d-f0de-4d09-bc19-562bc869f811" providerId="ADAL" clId="{F135010A-F226-44F5-BA4D-75AB3FEA5287}" dt="2018-08-15T12:14:45.706" v="34" actId="20577"/>
-          <ac:spMkLst>
-            <pc:docMk/>
-            <pc:sldMk cId="1721978392" sldId="258"/>
-            <ac:spMk id="3" creationId="{9102A9B4-46D9-4865-A76D-85392096181B}"/>
-          </ac:spMkLst>
-        </pc:spChg>
-      </pc:sldChg>
-    </pc:docChg>
-  </pc:docChgLst>
 </pc:chgInfo>
 </file>
 
@@ -302,7 +318,7 @@
           <a:noFill/>
           <a:extLst>
             <a:ext uri="{909E8E84-426E-40dd-AFC4-6F175D3DCCD1}">
-              <a14:hiddenFill xmlns:a14="http://schemas.microsoft.com/office/drawing/2010/main" xmlns="">
+              <a14:hiddenFill xmlns="" xmlns:a14="http://schemas.microsoft.com/office/drawing/2010/main">
                 <a:solidFill>
                   <a:srgbClr val="FFFFFF"/>
                 </a:solidFill>
@@ -361,7 +377,7 @@
             </a:ln>
             <a:extLst>
               <a:ext uri="{91240B29-F687-4f45-9708-019B960494DF}">
-                <a14:hiddenLine xmlns:a14="http://schemas.microsoft.com/office/drawing/2010/main" xmlns="" w="9525">
+                <a14:hiddenLine xmlns="" xmlns:a14="http://schemas.microsoft.com/office/drawing/2010/main" w="9525">
                   <a:solidFill>
                     <a:srgbClr val="000000"/>
                   </a:solidFill>
@@ -451,7 +467,7 @@
             </a:ln>
             <a:extLst>
               <a:ext uri="{91240B29-F687-4f45-9708-019B960494DF}">
-                <a14:hiddenLine xmlns:a14="http://schemas.microsoft.com/office/drawing/2010/main" xmlns="" w="9525">
+                <a14:hiddenLine xmlns="" xmlns:a14="http://schemas.microsoft.com/office/drawing/2010/main" w="9525">
                   <a:solidFill>
                     <a:srgbClr val="000000"/>
                   </a:solidFill>
@@ -541,7 +557,7 @@
             </a:ln>
             <a:extLst>
               <a:ext uri="{91240B29-F687-4f45-9708-019B960494DF}">
-                <a14:hiddenLine xmlns:a14="http://schemas.microsoft.com/office/drawing/2010/main" xmlns="" w="9525">
+                <a14:hiddenLine xmlns="" xmlns:a14="http://schemas.microsoft.com/office/drawing/2010/main" w="9525">
                   <a:solidFill>
                     <a:srgbClr val="000000"/>
                   </a:solidFill>
@@ -575,7 +591,7 @@
             </a:ln>
             <a:extLst>
               <a:ext uri="{91240B29-F687-4f45-9708-019B960494DF}">
-                <a14:hiddenLine xmlns:a14="http://schemas.microsoft.com/office/drawing/2010/main" xmlns="" w="9525">
+                <a14:hiddenLine xmlns="" xmlns:a14="http://schemas.microsoft.com/office/drawing/2010/main" w="9525">
                   <a:solidFill>
                     <a:srgbClr val="000000"/>
                   </a:solidFill>
@@ -665,7 +681,7 @@
             </a:ln>
             <a:extLst>
               <a:ext uri="{91240B29-F687-4f45-9708-019B960494DF}">
-                <a14:hiddenLine xmlns:a14="http://schemas.microsoft.com/office/drawing/2010/main" xmlns="" w="9525">
+                <a14:hiddenLine xmlns="" xmlns:a14="http://schemas.microsoft.com/office/drawing/2010/main" w="9525">
                   <a:solidFill>
                     <a:srgbClr val="000000"/>
                   </a:solidFill>
@@ -727,7 +743,7 @@
             </a:ln>
             <a:extLst>
               <a:ext uri="{91240B29-F687-4f45-9708-019B960494DF}">
-                <a14:hiddenLine xmlns:a14="http://schemas.microsoft.com/office/drawing/2010/main" xmlns="" w="9525">
+                <a14:hiddenLine xmlns="" xmlns:a14="http://schemas.microsoft.com/office/drawing/2010/main" w="9525">
                   <a:solidFill>
                     <a:srgbClr val="000000"/>
                   </a:solidFill>
@@ -789,7 +805,7 @@
             </a:ln>
             <a:extLst>
               <a:ext uri="{91240B29-F687-4f45-9708-019B960494DF}">
-                <a14:hiddenLine xmlns:a14="http://schemas.microsoft.com/office/drawing/2010/main" xmlns="" w="9525">
+                <a14:hiddenLine xmlns="" xmlns:a14="http://schemas.microsoft.com/office/drawing/2010/main" w="9525">
                   <a:solidFill>
                     <a:srgbClr val="000000"/>
                   </a:solidFill>
@@ -879,7 +895,7 @@
             </a:ln>
             <a:extLst>
               <a:ext uri="{91240B29-F687-4f45-9708-019B960494DF}">
-                <a14:hiddenLine xmlns:a14="http://schemas.microsoft.com/office/drawing/2010/main" xmlns="" w="9525">
+                <a14:hiddenLine xmlns="" xmlns:a14="http://schemas.microsoft.com/office/drawing/2010/main" w="9525">
                   <a:solidFill>
                     <a:srgbClr val="000000"/>
                   </a:solidFill>
@@ -941,7 +957,7 @@
             </a:ln>
             <a:extLst>
               <a:ext uri="{91240B29-F687-4f45-9708-019B960494DF}">
-                <a14:hiddenLine xmlns:a14="http://schemas.microsoft.com/office/drawing/2010/main" xmlns="" w="9525">
+                <a14:hiddenLine xmlns="" xmlns:a14="http://schemas.microsoft.com/office/drawing/2010/main" w="9525">
                   <a:solidFill>
                     <a:srgbClr val="000000"/>
                   </a:solidFill>
@@ -1003,7 +1019,7 @@
             </a:ln>
             <a:extLst>
               <a:ext uri="{91240B29-F687-4f45-9708-019B960494DF}">
-                <a14:hiddenLine xmlns:a14="http://schemas.microsoft.com/office/drawing/2010/main" xmlns="" w="9525">
+                <a14:hiddenLine xmlns="" xmlns:a14="http://schemas.microsoft.com/office/drawing/2010/main" w="9525">
                   <a:solidFill>
                     <a:srgbClr val="000000"/>
                   </a:solidFill>
@@ -1093,7 +1109,7 @@
             </a:ln>
             <a:extLst>
               <a:ext uri="{91240B29-F687-4f45-9708-019B960494DF}">
-                <a14:hiddenLine xmlns:a14="http://schemas.microsoft.com/office/drawing/2010/main" xmlns="" w="9525">
+                <a14:hiddenLine xmlns="" xmlns:a14="http://schemas.microsoft.com/office/drawing/2010/main" w="9525">
                   <a:solidFill>
                     <a:srgbClr val="000000"/>
                   </a:solidFill>
@@ -1183,7 +1199,7 @@
             </a:ln>
             <a:extLst>
               <a:ext uri="{91240B29-F687-4f45-9708-019B960494DF}">
-                <a14:hiddenLine xmlns:a14="http://schemas.microsoft.com/office/drawing/2010/main" xmlns="" w="9525">
+                <a14:hiddenLine xmlns="" xmlns:a14="http://schemas.microsoft.com/office/drawing/2010/main" w="9525">
                   <a:solidFill>
                     <a:srgbClr val="000000"/>
                   </a:solidFill>
@@ -1245,7 +1261,7 @@
             </a:ln>
             <a:extLst>
               <a:ext uri="{91240B29-F687-4f45-9708-019B960494DF}">
-                <a14:hiddenLine xmlns:a14="http://schemas.microsoft.com/office/drawing/2010/main" xmlns="" w="9525">
+                <a14:hiddenLine xmlns="" xmlns:a14="http://schemas.microsoft.com/office/drawing/2010/main" w="9525">
                   <a:solidFill>
                     <a:srgbClr val="000000"/>
                   </a:solidFill>
@@ -1355,7 +1371,7 @@
             </a:ln>
             <a:extLst>
               <a:ext uri="{91240B29-F687-4f45-9708-019B960494DF}">
-                <a14:hiddenLine xmlns:a14="http://schemas.microsoft.com/office/drawing/2010/main" xmlns="" w="9525">
+                <a14:hiddenLine xmlns="" xmlns:a14="http://schemas.microsoft.com/office/drawing/2010/main" w="9525">
                   <a:solidFill>
                     <a:srgbClr val="000000"/>
                   </a:solidFill>
@@ -1417,7 +1433,7 @@
             </a:ln>
             <a:extLst>
               <a:ext uri="{91240B29-F687-4f45-9708-019B960494DF}">
-                <a14:hiddenLine xmlns:a14="http://schemas.microsoft.com/office/drawing/2010/main" xmlns="" w="9525">
+                <a14:hiddenLine xmlns="" xmlns:a14="http://schemas.microsoft.com/office/drawing/2010/main" w="9525">
                   <a:solidFill>
                     <a:srgbClr val="000000"/>
                   </a:solidFill>
@@ -1507,7 +1523,7 @@
             </a:ln>
             <a:extLst>
               <a:ext uri="{91240B29-F687-4f45-9708-019B960494DF}">
-                <a14:hiddenLine xmlns:a14="http://schemas.microsoft.com/office/drawing/2010/main" xmlns="" w="9525">
+                <a14:hiddenLine xmlns="" xmlns:a14="http://schemas.microsoft.com/office/drawing/2010/main" w="9525">
                   <a:solidFill>
                     <a:srgbClr val="000000"/>
                   </a:solidFill>
@@ -1597,7 +1613,7 @@
             </a:ln>
             <a:extLst>
               <a:ext uri="{91240B29-F687-4f45-9708-019B960494DF}">
-                <a14:hiddenLine xmlns:a14="http://schemas.microsoft.com/office/drawing/2010/main" xmlns="" w="9525">
+                <a14:hiddenLine xmlns="" xmlns:a14="http://schemas.microsoft.com/office/drawing/2010/main" w="9525">
                   <a:solidFill>
                     <a:srgbClr val="000000"/>
                   </a:solidFill>
@@ -1659,7 +1675,7 @@
             </a:ln>
             <a:extLst>
               <a:ext uri="{91240B29-F687-4f45-9708-019B960494DF}">
-                <a14:hiddenLine xmlns:a14="http://schemas.microsoft.com/office/drawing/2010/main" xmlns="" w="9525">
+                <a14:hiddenLine xmlns="" xmlns:a14="http://schemas.microsoft.com/office/drawing/2010/main" w="9525">
                   <a:solidFill>
                     <a:srgbClr val="000000"/>
                   </a:solidFill>
@@ -1749,7 +1765,7 @@
             </a:ln>
             <a:extLst>
               <a:ext uri="{91240B29-F687-4f45-9708-019B960494DF}">
-                <a14:hiddenLine xmlns:a14="http://schemas.microsoft.com/office/drawing/2010/main" xmlns="" w="9525">
+                <a14:hiddenLine xmlns="" xmlns:a14="http://schemas.microsoft.com/office/drawing/2010/main" w="9525">
                   <a:solidFill>
                     <a:srgbClr val="000000"/>
                   </a:solidFill>
@@ -1839,7 +1855,7 @@
             </a:ln>
             <a:extLst>
               <a:ext uri="{91240B29-F687-4f45-9708-019B960494DF}">
-                <a14:hiddenLine xmlns:a14="http://schemas.microsoft.com/office/drawing/2010/main" xmlns="" w="9525">
+                <a14:hiddenLine xmlns="" xmlns:a14="http://schemas.microsoft.com/office/drawing/2010/main" w="9525">
                   <a:solidFill>
                     <a:srgbClr val="000000"/>
                   </a:solidFill>
@@ -1895,7 +1911,7 @@
             </a:ln>
             <a:extLst>
               <a:ext uri="{91240B29-F687-4f45-9708-019B960494DF}">
-                <a14:hiddenLine xmlns:a14="http://schemas.microsoft.com/office/drawing/2010/main" xmlns="" w="9525">
+                <a14:hiddenLine xmlns="" xmlns:a14="http://schemas.microsoft.com/office/drawing/2010/main" w="9525">
                   <a:solidFill>
                     <a:srgbClr val="000000"/>
                   </a:solidFill>
@@ -1985,7 +2001,7 @@
             </a:ln>
             <a:extLst>
               <a:ext uri="{91240B29-F687-4f45-9708-019B960494DF}">
-                <a14:hiddenLine xmlns:a14="http://schemas.microsoft.com/office/drawing/2010/main" xmlns="" w="9525">
+                <a14:hiddenLine xmlns="" xmlns:a14="http://schemas.microsoft.com/office/drawing/2010/main" w="9525">
                   <a:solidFill>
                     <a:srgbClr val="000000"/>
                   </a:solidFill>
@@ -2041,7 +2057,7 @@
             </a:ln>
             <a:extLst>
               <a:ext uri="{91240B29-F687-4f45-9708-019B960494DF}">
-                <a14:hiddenLine xmlns:a14="http://schemas.microsoft.com/office/drawing/2010/main" xmlns="" w="9525">
+                <a14:hiddenLine xmlns="" xmlns:a14="http://schemas.microsoft.com/office/drawing/2010/main" w="9525">
                   <a:solidFill>
                     <a:srgbClr val="000000"/>
                   </a:solidFill>
@@ -2131,7 +2147,7 @@
             </a:ln>
             <a:extLst>
               <a:ext uri="{91240B29-F687-4f45-9708-019B960494DF}">
-                <a14:hiddenLine xmlns:a14="http://schemas.microsoft.com/office/drawing/2010/main" xmlns="" w="9525">
+                <a14:hiddenLine xmlns="" xmlns:a14="http://schemas.microsoft.com/office/drawing/2010/main" w="9525">
                   <a:solidFill>
                     <a:srgbClr val="000000"/>
                   </a:solidFill>
@@ -2199,7 +2215,7 @@
             </a:ln>
             <a:extLst>
               <a:ext uri="{91240B29-F687-4f45-9708-019B960494DF}">
-                <a14:hiddenLine xmlns:a14="http://schemas.microsoft.com/office/drawing/2010/main" xmlns="" w="9525">
+                <a14:hiddenLine xmlns="" xmlns:a14="http://schemas.microsoft.com/office/drawing/2010/main" w="9525">
                   <a:solidFill>
                     <a:srgbClr val="000000"/>
                   </a:solidFill>
@@ -2289,7 +2305,7 @@
             </a:ln>
             <a:extLst>
               <a:ext uri="{91240B29-F687-4f45-9708-019B960494DF}">
-                <a14:hiddenLine xmlns:a14="http://schemas.microsoft.com/office/drawing/2010/main" xmlns="" w="9525">
+                <a14:hiddenLine xmlns="" xmlns:a14="http://schemas.microsoft.com/office/drawing/2010/main" w="9525">
                   <a:solidFill>
                     <a:srgbClr val="000000"/>
                   </a:solidFill>
@@ -2357,7 +2373,7 @@
             </a:ln>
             <a:extLst>
               <a:ext uri="{91240B29-F687-4f45-9708-019B960494DF}">
-                <a14:hiddenLine xmlns:a14="http://schemas.microsoft.com/office/drawing/2010/main" xmlns="" w="9525">
+                <a14:hiddenLine xmlns="" xmlns:a14="http://schemas.microsoft.com/office/drawing/2010/main" w="9525">
                   <a:solidFill>
                     <a:srgbClr val="000000"/>
                   </a:solidFill>
@@ -2447,7 +2463,7 @@
             </a:ln>
             <a:extLst>
               <a:ext uri="{91240B29-F687-4f45-9708-019B960494DF}">
-                <a14:hiddenLine xmlns:a14="http://schemas.microsoft.com/office/drawing/2010/main" xmlns="" w="9525">
+                <a14:hiddenLine xmlns="" xmlns:a14="http://schemas.microsoft.com/office/drawing/2010/main" w="9525">
                   <a:solidFill>
                     <a:srgbClr val="000000"/>
                   </a:solidFill>
@@ -2481,7 +2497,7 @@
             </a:ln>
             <a:extLst>
               <a:ext uri="{91240B29-F687-4f45-9708-019B960494DF}">
-                <a14:hiddenLine xmlns:a14="http://schemas.microsoft.com/office/drawing/2010/main" xmlns="" w="9525">
+                <a14:hiddenLine xmlns="" xmlns:a14="http://schemas.microsoft.com/office/drawing/2010/main" w="9525">
                   <a:solidFill>
                     <a:srgbClr val="000000"/>
                   </a:solidFill>
@@ -2571,7 +2587,7 @@
             </a:ln>
             <a:extLst>
               <a:ext uri="{91240B29-F687-4f45-9708-019B960494DF}">
-                <a14:hiddenLine xmlns:a14="http://schemas.microsoft.com/office/drawing/2010/main" xmlns="" w="9525">
+                <a14:hiddenLine xmlns="" xmlns:a14="http://schemas.microsoft.com/office/drawing/2010/main" w="9525">
                   <a:solidFill>
                     <a:srgbClr val="000000"/>
                   </a:solidFill>
@@ -2633,7 +2649,7 @@
             </a:ln>
             <a:extLst>
               <a:ext uri="{91240B29-F687-4f45-9708-019B960494DF}">
-                <a14:hiddenLine xmlns:a14="http://schemas.microsoft.com/office/drawing/2010/main" xmlns="" w="9525">
+                <a14:hiddenLine xmlns="" xmlns:a14="http://schemas.microsoft.com/office/drawing/2010/main" w="9525">
                   <a:solidFill>
                     <a:srgbClr val="000000"/>
                   </a:solidFill>
@@ -2695,7 +2711,7 @@
             </a:ln>
             <a:extLst>
               <a:ext uri="{91240B29-F687-4f45-9708-019B960494DF}">
-                <a14:hiddenLine xmlns:a14="http://schemas.microsoft.com/office/drawing/2010/main" xmlns="" w="9525">
+                <a14:hiddenLine xmlns="" xmlns:a14="http://schemas.microsoft.com/office/drawing/2010/main" w="9525">
                   <a:solidFill>
                     <a:srgbClr val="000000"/>
                   </a:solidFill>
@@ -2785,7 +2801,7 @@
             </a:ln>
             <a:extLst>
               <a:ext uri="{91240B29-F687-4f45-9708-019B960494DF}">
-                <a14:hiddenLine xmlns:a14="http://schemas.microsoft.com/office/drawing/2010/main" xmlns="" w="9525">
+                <a14:hiddenLine xmlns="" xmlns:a14="http://schemas.microsoft.com/office/drawing/2010/main" w="9525">
                   <a:solidFill>
                     <a:srgbClr val="000000"/>
                   </a:solidFill>
@@ -2853,7 +2869,7 @@
             </a:ln>
             <a:extLst>
               <a:ext uri="{91240B29-F687-4f45-9708-019B960494DF}">
-                <a14:hiddenLine xmlns:a14="http://schemas.microsoft.com/office/drawing/2010/main" xmlns="" w="9525">
+                <a14:hiddenLine xmlns="" xmlns:a14="http://schemas.microsoft.com/office/drawing/2010/main" w="9525">
                   <a:solidFill>
                     <a:srgbClr val="000000"/>
                   </a:solidFill>
@@ -2915,7 +2931,7 @@
             </a:ln>
             <a:extLst>
               <a:ext uri="{91240B29-F687-4f45-9708-019B960494DF}">
-                <a14:hiddenLine xmlns:a14="http://schemas.microsoft.com/office/drawing/2010/main" xmlns="" w="9525">
+                <a14:hiddenLine xmlns="" xmlns:a14="http://schemas.microsoft.com/office/drawing/2010/main" w="9525">
                   <a:solidFill>
                     <a:srgbClr val="000000"/>
                   </a:solidFill>
@@ -3005,7 +3021,7 @@
             </a:ln>
             <a:extLst>
               <a:ext uri="{91240B29-F687-4f45-9708-019B960494DF}">
-                <a14:hiddenLine xmlns:a14="http://schemas.microsoft.com/office/drawing/2010/main" xmlns="" w="9525">
+                <a14:hiddenLine xmlns="" xmlns:a14="http://schemas.microsoft.com/office/drawing/2010/main" w="9525">
                   <a:solidFill>
                     <a:srgbClr val="000000"/>
                   </a:solidFill>
@@ -3067,7 +3083,7 @@
             </a:ln>
             <a:extLst>
               <a:ext uri="{91240B29-F687-4f45-9708-019B960494DF}">
-                <a14:hiddenLine xmlns:a14="http://schemas.microsoft.com/office/drawing/2010/main" xmlns="" w="9525">
+                <a14:hiddenLine xmlns="" xmlns:a14="http://schemas.microsoft.com/office/drawing/2010/main" w="9525">
                   <a:solidFill>
                     <a:srgbClr val="000000"/>
                   </a:solidFill>
@@ -3157,7 +3173,7 @@
             </a:ln>
             <a:extLst>
               <a:ext uri="{91240B29-F687-4f45-9708-019B960494DF}">
-                <a14:hiddenLine xmlns:a14="http://schemas.microsoft.com/office/drawing/2010/main" xmlns="" w="9525">
+                <a14:hiddenLine xmlns="" xmlns:a14="http://schemas.microsoft.com/office/drawing/2010/main" w="9525">
                   <a:solidFill>
                     <a:srgbClr val="000000"/>
                   </a:solidFill>
@@ -3219,7 +3235,7 @@
             </a:ln>
             <a:extLst>
               <a:ext uri="{91240B29-F687-4f45-9708-019B960494DF}">
-                <a14:hiddenLine xmlns:a14="http://schemas.microsoft.com/office/drawing/2010/main" xmlns="" w="9525">
+                <a14:hiddenLine xmlns="" xmlns:a14="http://schemas.microsoft.com/office/drawing/2010/main" w="9525">
                   <a:solidFill>
                     <a:srgbClr val="000000"/>
                   </a:solidFill>
@@ -3309,7 +3325,7 @@
             </a:ln>
             <a:extLst>
               <a:ext uri="{91240B29-F687-4f45-9708-019B960494DF}">
-                <a14:hiddenLine xmlns:a14="http://schemas.microsoft.com/office/drawing/2010/main" xmlns="" w="9525">
+                <a14:hiddenLine xmlns="" xmlns:a14="http://schemas.microsoft.com/office/drawing/2010/main" w="9525">
                   <a:solidFill>
                     <a:srgbClr val="000000"/>
                   </a:solidFill>
@@ -3343,7 +3359,7 @@
             </a:ln>
             <a:extLst>
               <a:ext uri="{91240B29-F687-4f45-9708-019B960494DF}">
-                <a14:hiddenLine xmlns:a14="http://schemas.microsoft.com/office/drawing/2010/main" xmlns="" w="9525">
+                <a14:hiddenLine xmlns="" xmlns:a14="http://schemas.microsoft.com/office/drawing/2010/main" w="9525">
                   <a:solidFill>
                     <a:srgbClr val="000000"/>
                   </a:solidFill>
@@ -3408,7 +3424,7 @@
             </a:ln>
             <a:extLst>
               <a:ext uri="{91240B29-F687-4f45-9708-019B960494DF}">
-                <a14:hiddenLine xmlns:a14="http://schemas.microsoft.com/office/drawing/2010/main" xmlns="" w="9525">
+                <a14:hiddenLine xmlns="" xmlns:a14="http://schemas.microsoft.com/office/drawing/2010/main" w="9525">
                   <a:solidFill>
                     <a:srgbClr val="000000"/>
                   </a:solidFill>
@@ -3498,7 +3514,7 @@
             </a:ln>
             <a:extLst>
               <a:ext uri="{91240B29-F687-4f45-9708-019B960494DF}">
-                <a14:hiddenLine xmlns:a14="http://schemas.microsoft.com/office/drawing/2010/main" xmlns="" w="9525">
+                <a14:hiddenLine xmlns="" xmlns:a14="http://schemas.microsoft.com/office/drawing/2010/main" w="9525">
                   <a:solidFill>
                     <a:srgbClr val="000000"/>
                   </a:solidFill>
@@ -3560,7 +3576,7 @@
             </a:ln>
             <a:extLst>
               <a:ext uri="{91240B29-F687-4f45-9708-019B960494DF}">
-                <a14:hiddenLine xmlns:a14="http://schemas.microsoft.com/office/drawing/2010/main" xmlns="" w="9525">
+                <a14:hiddenLine xmlns="" xmlns:a14="http://schemas.microsoft.com/office/drawing/2010/main" w="9525">
                   <a:solidFill>
                     <a:srgbClr val="000000"/>
                   </a:solidFill>
@@ -3650,7 +3666,7 @@
             </a:ln>
             <a:extLst>
               <a:ext uri="{91240B29-F687-4f45-9708-019B960494DF}">
-                <a14:hiddenLine xmlns:a14="http://schemas.microsoft.com/office/drawing/2010/main" xmlns="" w="9525">
+                <a14:hiddenLine xmlns="" xmlns:a14="http://schemas.microsoft.com/office/drawing/2010/main" w="9525">
                   <a:solidFill>
                     <a:srgbClr val="000000"/>
                   </a:solidFill>
@@ -3740,7 +3756,7 @@
             </a:ln>
             <a:extLst>
               <a:ext uri="{91240B29-F687-4f45-9708-019B960494DF}">
-                <a14:hiddenLine xmlns:a14="http://schemas.microsoft.com/office/drawing/2010/main" xmlns="" w="9525">
+                <a14:hiddenLine xmlns="" xmlns:a14="http://schemas.microsoft.com/office/drawing/2010/main" w="9525">
                   <a:solidFill>
                     <a:srgbClr val="000000"/>
                   </a:solidFill>
@@ -3805,7 +3821,7 @@
             </a:ln>
             <a:extLst>
               <a:ext uri="{91240B29-F687-4f45-9708-019B960494DF}">
-                <a14:hiddenLine xmlns:a14="http://schemas.microsoft.com/office/drawing/2010/main" xmlns="" w="9525">
+                <a14:hiddenLine xmlns="" xmlns:a14="http://schemas.microsoft.com/office/drawing/2010/main" w="9525">
                   <a:solidFill>
                     <a:srgbClr val="000000"/>
                   </a:solidFill>
@@ -3867,7 +3883,7 @@
             </a:ln>
             <a:extLst>
               <a:ext uri="{91240B29-F687-4f45-9708-019B960494DF}">
-                <a14:hiddenLine xmlns:a14="http://schemas.microsoft.com/office/drawing/2010/main" xmlns="" w="9525">
+                <a14:hiddenLine xmlns="" xmlns:a14="http://schemas.microsoft.com/office/drawing/2010/main" w="9525">
                   <a:solidFill>
                     <a:srgbClr val="000000"/>
                   </a:solidFill>
@@ -3957,7 +3973,7 @@
             </a:ln>
             <a:extLst>
               <a:ext uri="{91240B29-F687-4f45-9708-019B960494DF}">
-                <a14:hiddenLine xmlns:a14="http://schemas.microsoft.com/office/drawing/2010/main" xmlns="" w="9525">
+                <a14:hiddenLine xmlns="" xmlns:a14="http://schemas.microsoft.com/office/drawing/2010/main" w="9525">
                   <a:solidFill>
                     <a:srgbClr val="000000"/>
                   </a:solidFill>
@@ -4047,7 +4063,7 @@
             </a:ln>
             <a:extLst>
               <a:ext uri="{91240B29-F687-4f45-9708-019B960494DF}">
-                <a14:hiddenLine xmlns:a14="http://schemas.microsoft.com/office/drawing/2010/main" xmlns="" w="9525">
+                <a14:hiddenLine xmlns="" xmlns:a14="http://schemas.microsoft.com/office/drawing/2010/main" w="9525">
                   <a:solidFill>
                     <a:srgbClr val="000000"/>
                   </a:solidFill>
@@ -4109,7 +4125,7 @@
             </a:ln>
             <a:extLst>
               <a:ext uri="{91240B29-F687-4f45-9708-019B960494DF}">
-                <a14:hiddenLine xmlns:a14="http://schemas.microsoft.com/office/drawing/2010/main" xmlns="" w="9525">
+                <a14:hiddenLine xmlns="" xmlns:a14="http://schemas.microsoft.com/office/drawing/2010/main" w="9525">
                   <a:solidFill>
                     <a:srgbClr val="000000"/>
                   </a:solidFill>
@@ -4229,7 +4245,7 @@
             </a:ln>
             <a:extLst>
               <a:ext uri="{91240B29-F687-4f45-9708-019B960494DF}">
-                <a14:hiddenLine xmlns:a14="http://schemas.microsoft.com/office/drawing/2010/main" xmlns="" w="9525">
+                <a14:hiddenLine xmlns="" xmlns:a14="http://schemas.microsoft.com/office/drawing/2010/main" w="9525">
                   <a:solidFill>
                     <a:srgbClr val="000000"/>
                   </a:solidFill>
@@ -4297,7 +4313,7 @@
             </a:ln>
             <a:extLst>
               <a:ext uri="{91240B29-F687-4f45-9708-019B960494DF}">
-                <a14:hiddenLine xmlns:a14="http://schemas.microsoft.com/office/drawing/2010/main" xmlns="" w="9525">
+                <a14:hiddenLine xmlns="" xmlns:a14="http://schemas.microsoft.com/office/drawing/2010/main" w="9525">
                   <a:solidFill>
                     <a:srgbClr val="000000"/>
                   </a:solidFill>
@@ -4387,7 +4403,7 @@
             </a:ln>
             <a:extLst>
               <a:ext uri="{91240B29-F687-4f45-9708-019B960494DF}">
-                <a14:hiddenLine xmlns:a14="http://schemas.microsoft.com/office/drawing/2010/main" xmlns="" w="9525">
+                <a14:hiddenLine xmlns="" xmlns:a14="http://schemas.microsoft.com/office/drawing/2010/main" w="9525">
                   <a:solidFill>
                     <a:srgbClr val="000000"/>
                   </a:solidFill>
@@ -4527,7 +4543,7 @@
           <a:p>
             <a:fld id="{48A87A34-81AB-432B-8DAE-1953F412C126}" type="datetimeFigureOut">
               <a:rPr lang="en-US" dirty="0"/>
-              <a:t>8/29/18</a:t>
+              <a:t>9/6/2018</a:t>
             </a:fld>
             <a:endParaRPr lang="en-US" dirty="0"/>
           </a:p>
@@ -4789,7 +4805,7 @@
           <a:p>
             <a:fld id="{48A87A34-81AB-432B-8DAE-1953F412C126}" type="datetimeFigureOut">
               <a:rPr lang="en-US" dirty="0"/>
-              <a:t>8/29/18</a:t>
+              <a:t>9/6/2018</a:t>
             </a:fld>
             <a:endParaRPr lang="en-US" dirty="0"/>
           </a:p>
@@ -4980,7 +4996,7 @@
           <a:p>
             <a:fld id="{48A87A34-81AB-432B-8DAE-1953F412C126}" type="datetimeFigureOut">
               <a:rPr lang="en-US" dirty="0"/>
-              <a:t>8/29/18</a:t>
+              <a:t>9/6/2018</a:t>
             </a:fld>
             <a:endParaRPr lang="en-US" dirty="0"/>
           </a:p>
@@ -5238,7 +5254,7 @@
           <a:p>
             <a:fld id="{48A87A34-81AB-432B-8DAE-1953F412C126}" type="datetimeFigureOut">
               <a:rPr lang="en-US" dirty="0"/>
-              <a:t>8/29/18</a:t>
+              <a:t>9/6/2018</a:t>
             </a:fld>
             <a:endParaRPr lang="en-US" dirty="0"/>
           </a:p>
@@ -5667,7 +5683,7 @@
           <a:p>
             <a:fld id="{48A87A34-81AB-432B-8DAE-1953F412C126}" type="datetimeFigureOut">
               <a:rPr lang="en-US" dirty="0"/>
-              <a:t>8/29/18</a:t>
+              <a:t>9/6/2018</a:t>
             </a:fld>
             <a:endParaRPr lang="en-US" dirty="0"/>
           </a:p>
@@ -6208,7 +6224,7 @@
           <a:p>
             <a:fld id="{48A87A34-81AB-432B-8DAE-1953F412C126}" type="datetimeFigureOut">
               <a:rPr lang="en-US" dirty="0"/>
-              <a:t>8/29/18</a:t>
+              <a:t>9/6/2018</a:t>
             </a:fld>
             <a:endParaRPr lang="en-US" dirty="0"/>
           </a:p>
@@ -6923,7 +6939,7 @@
           <a:p>
             <a:fld id="{48A87A34-81AB-432B-8DAE-1953F412C126}" type="datetimeFigureOut">
               <a:rPr lang="en-US" dirty="0"/>
-              <a:t>8/29/18</a:t>
+              <a:t>9/6/2018</a:t>
             </a:fld>
             <a:endParaRPr lang="en-US" dirty="0"/>
           </a:p>
@@ -7088,7 +7104,7 @@
           <a:p>
             <a:fld id="{48A87A34-81AB-432B-8DAE-1953F412C126}" type="datetimeFigureOut">
               <a:rPr lang="en-US" dirty="0"/>
-              <a:t>8/29/18</a:t>
+              <a:t>9/6/2018</a:t>
             </a:fld>
             <a:endParaRPr lang="en-US" dirty="0"/>
           </a:p>
@@ -7263,7 +7279,7 @@
           <a:p>
             <a:fld id="{48A87A34-81AB-432B-8DAE-1953F412C126}" type="datetimeFigureOut">
               <a:rPr lang="en-US" dirty="0"/>
-              <a:t>8/29/18</a:t>
+              <a:t>9/6/2018</a:t>
             </a:fld>
             <a:endParaRPr lang="en-US" dirty="0"/>
           </a:p>
@@ -7428,7 +7444,7 @@
           <a:p>
             <a:fld id="{48A87A34-81AB-432B-8DAE-1953F412C126}" type="datetimeFigureOut">
               <a:rPr lang="en-US" dirty="0"/>
-              <a:t>8/29/18</a:t>
+              <a:t>9/6/2018</a:t>
             </a:fld>
             <a:endParaRPr lang="en-US" dirty="0"/>
           </a:p>
@@ -7673,7 +7689,7 @@
           <a:p>
             <a:fld id="{48A87A34-81AB-432B-8DAE-1953F412C126}" type="datetimeFigureOut">
               <a:rPr lang="en-US" dirty="0"/>
-              <a:t>8/29/18</a:t>
+              <a:t>9/6/2018</a:t>
             </a:fld>
             <a:endParaRPr lang="en-US" dirty="0"/>
           </a:p>
@@ -7900,7 +7916,7 @@
           <a:p>
             <a:fld id="{48A87A34-81AB-432B-8DAE-1953F412C126}" type="datetimeFigureOut">
               <a:rPr lang="en-US" dirty="0"/>
-              <a:t>8/29/18</a:t>
+              <a:t>9/6/2018</a:t>
             </a:fld>
             <a:endParaRPr lang="en-US" dirty="0"/>
           </a:p>
@@ -8276,7 +8292,7 @@
           <a:p>
             <a:fld id="{48A87A34-81AB-432B-8DAE-1953F412C126}" type="datetimeFigureOut">
               <a:rPr lang="en-US" dirty="0"/>
-              <a:t>8/29/18</a:t>
+              <a:t>9/6/2018</a:t>
             </a:fld>
             <a:endParaRPr lang="en-US" dirty="0"/>
           </a:p>
@@ -8389,7 +8405,7 @@
           <a:p>
             <a:fld id="{48A87A34-81AB-432B-8DAE-1953F412C126}" type="datetimeFigureOut">
               <a:rPr lang="en-US" dirty="0"/>
-              <a:t>8/29/18</a:t>
+              <a:t>9/6/2018</a:t>
             </a:fld>
             <a:endParaRPr lang="en-US" dirty="0"/>
           </a:p>
@@ -8479,7 +8495,7 @@
           <a:p>
             <a:fld id="{48A87A34-81AB-432B-8DAE-1953F412C126}" type="datetimeFigureOut">
               <a:rPr lang="en-US" dirty="0"/>
-              <a:t>8/29/18</a:t>
+              <a:t>9/6/2018</a:t>
             </a:fld>
             <a:endParaRPr lang="en-US" dirty="0"/>
           </a:p>
@@ -8723,7 +8739,7 @@
           <a:p>
             <a:fld id="{48A87A34-81AB-432B-8DAE-1953F412C126}" type="datetimeFigureOut">
               <a:rPr lang="en-US" dirty="0"/>
-              <a:t>8/29/18</a:t>
+              <a:t>9/6/2018</a:t>
             </a:fld>
             <a:endParaRPr lang="en-US" dirty="0"/>
           </a:p>
@@ -8998,7 +9014,7 @@
           <a:p>
             <a:fld id="{48A87A34-81AB-432B-8DAE-1953F412C126}" type="datetimeFigureOut">
               <a:rPr lang="en-US" dirty="0"/>
-              <a:t>8/29/18</a:t>
+              <a:t>9/6/2018</a:t>
             </a:fld>
             <a:endParaRPr lang="en-US" dirty="0"/>
           </a:p>
@@ -9116,7 +9132,7 @@
           <a:noFill/>
           <a:extLst>
             <a:ext uri="{909E8E84-426E-40dd-AFC4-6F175D3DCCD1}">
-              <a14:hiddenFill xmlns:a14="http://schemas.microsoft.com/office/drawing/2010/main" xmlns="">
+              <a14:hiddenFill xmlns="" xmlns:a14="http://schemas.microsoft.com/office/drawing/2010/main">
                 <a:solidFill>
                   <a:srgbClr val="FFFFFF"/>
                 </a:solidFill>
@@ -9190,7 +9206,7 @@
               </a:ln>
               <a:extLst>
                 <a:ext uri="{91240B29-F687-4f45-9708-019B960494DF}">
-                  <a14:hiddenLine xmlns:a14="http://schemas.microsoft.com/office/drawing/2010/main" xmlns="" w="9525">
+                  <a14:hiddenLine xmlns="" xmlns:a14="http://schemas.microsoft.com/office/drawing/2010/main" w="9525">
                     <a:solidFill>
                       <a:srgbClr val="000000"/>
                     </a:solidFill>
@@ -9280,7 +9296,7 @@
               </a:ln>
               <a:extLst>
                 <a:ext uri="{91240B29-F687-4f45-9708-019B960494DF}">
-                  <a14:hiddenLine xmlns:a14="http://schemas.microsoft.com/office/drawing/2010/main" xmlns="" w="9525">
+                  <a14:hiddenLine xmlns="" xmlns:a14="http://schemas.microsoft.com/office/drawing/2010/main" w="9525">
                     <a:solidFill>
                       <a:srgbClr val="000000"/>
                     </a:solidFill>
@@ -9370,7 +9386,7 @@
               </a:ln>
               <a:extLst>
                 <a:ext uri="{91240B29-F687-4f45-9708-019B960494DF}">
-                  <a14:hiddenLine xmlns:a14="http://schemas.microsoft.com/office/drawing/2010/main" xmlns="" w="9525">
+                  <a14:hiddenLine xmlns="" xmlns:a14="http://schemas.microsoft.com/office/drawing/2010/main" w="9525">
                     <a:solidFill>
                       <a:srgbClr val="000000"/>
                     </a:solidFill>
@@ -9432,7 +9448,7 @@
               </a:ln>
               <a:extLst>
                 <a:ext uri="{91240B29-F687-4f45-9708-019B960494DF}">
-                  <a14:hiddenLine xmlns:a14="http://schemas.microsoft.com/office/drawing/2010/main" xmlns="" w="9525">
+                  <a14:hiddenLine xmlns="" xmlns:a14="http://schemas.microsoft.com/office/drawing/2010/main" w="9525">
                     <a:solidFill>
                       <a:srgbClr val="000000"/>
                     </a:solidFill>
@@ -9522,7 +9538,7 @@
               </a:ln>
               <a:extLst>
                 <a:ext uri="{91240B29-F687-4f45-9708-019B960494DF}">
-                  <a14:hiddenLine xmlns:a14="http://schemas.microsoft.com/office/drawing/2010/main" xmlns="" w="9525">
+                  <a14:hiddenLine xmlns="" xmlns:a14="http://schemas.microsoft.com/office/drawing/2010/main" w="9525">
                     <a:solidFill>
                       <a:srgbClr val="000000"/>
                     </a:solidFill>
@@ -9584,7 +9600,7 @@
               </a:ln>
               <a:extLst>
                 <a:ext uri="{91240B29-F687-4f45-9708-019B960494DF}">
-                  <a14:hiddenLine xmlns:a14="http://schemas.microsoft.com/office/drawing/2010/main" xmlns="" w="9525">
+                  <a14:hiddenLine xmlns="" xmlns:a14="http://schemas.microsoft.com/office/drawing/2010/main" w="9525">
                     <a:solidFill>
                       <a:srgbClr val="000000"/>
                     </a:solidFill>
@@ -9646,7 +9662,7 @@
               </a:ln>
               <a:extLst>
                 <a:ext uri="{91240B29-F687-4f45-9708-019B960494DF}">
-                  <a14:hiddenLine xmlns:a14="http://schemas.microsoft.com/office/drawing/2010/main" xmlns="" w="9525">
+                  <a14:hiddenLine xmlns="" xmlns:a14="http://schemas.microsoft.com/office/drawing/2010/main" w="9525">
                     <a:solidFill>
                       <a:srgbClr val="000000"/>
                     </a:solidFill>
@@ -9736,7 +9752,7 @@
               </a:ln>
               <a:extLst>
                 <a:ext uri="{91240B29-F687-4f45-9708-019B960494DF}">
-                  <a14:hiddenLine xmlns:a14="http://schemas.microsoft.com/office/drawing/2010/main" xmlns="" w="9525">
+                  <a14:hiddenLine xmlns="" xmlns:a14="http://schemas.microsoft.com/office/drawing/2010/main" w="9525">
                     <a:solidFill>
                       <a:srgbClr val="000000"/>
                     </a:solidFill>
@@ -9826,7 +9842,7 @@
               </a:ln>
               <a:extLst>
                 <a:ext uri="{91240B29-F687-4f45-9708-019B960494DF}">
-                  <a14:hiddenLine xmlns:a14="http://schemas.microsoft.com/office/drawing/2010/main" xmlns="" w="9525">
+                  <a14:hiddenLine xmlns="" xmlns:a14="http://schemas.microsoft.com/office/drawing/2010/main" w="9525">
                     <a:solidFill>
                       <a:srgbClr val="000000"/>
                     </a:solidFill>
@@ -9888,7 +9904,7 @@
               </a:ln>
               <a:extLst>
                 <a:ext uri="{91240B29-F687-4f45-9708-019B960494DF}">
-                  <a14:hiddenLine xmlns:a14="http://schemas.microsoft.com/office/drawing/2010/main" xmlns="" w="9525">
+                  <a14:hiddenLine xmlns="" xmlns:a14="http://schemas.microsoft.com/office/drawing/2010/main" w="9525">
                     <a:solidFill>
                       <a:srgbClr val="000000"/>
                     </a:solidFill>
@@ -9998,7 +10014,7 @@
               </a:ln>
               <a:extLst>
                 <a:ext uri="{91240B29-F687-4f45-9708-019B960494DF}">
-                  <a14:hiddenLine xmlns:a14="http://schemas.microsoft.com/office/drawing/2010/main" xmlns="" w="9525">
+                  <a14:hiddenLine xmlns="" xmlns:a14="http://schemas.microsoft.com/office/drawing/2010/main" w="9525">
                     <a:solidFill>
                       <a:srgbClr val="000000"/>
                     </a:solidFill>
@@ -10082,7 +10098,7 @@
               </a:ln>
               <a:extLst>
                 <a:ext uri="{91240B29-F687-4f45-9708-019B960494DF}">
-                  <a14:hiddenLine xmlns:a14="http://schemas.microsoft.com/office/drawing/2010/main" xmlns="" w="9525">
+                  <a14:hiddenLine xmlns="" xmlns:a14="http://schemas.microsoft.com/office/drawing/2010/main" w="9525">
                     <a:solidFill>
                       <a:srgbClr val="000000"/>
                     </a:solidFill>
@@ -10144,7 +10160,7 @@
               </a:ln>
               <a:extLst>
                 <a:ext uri="{91240B29-F687-4f45-9708-019B960494DF}">
-                  <a14:hiddenLine xmlns:a14="http://schemas.microsoft.com/office/drawing/2010/main" xmlns="" w="9525">
+                  <a14:hiddenLine xmlns="" xmlns:a14="http://schemas.microsoft.com/office/drawing/2010/main" w="9525">
                     <a:solidFill>
                       <a:srgbClr val="000000"/>
                     </a:solidFill>
@@ -10206,7 +10222,7 @@
               </a:ln>
               <a:extLst>
                 <a:ext uri="{91240B29-F687-4f45-9708-019B960494DF}">
-                  <a14:hiddenLine xmlns:a14="http://schemas.microsoft.com/office/drawing/2010/main" xmlns="" w="9525">
+                  <a14:hiddenLine xmlns="" xmlns:a14="http://schemas.microsoft.com/office/drawing/2010/main" w="9525">
                     <a:solidFill>
                       <a:srgbClr val="000000"/>
                     </a:solidFill>
@@ -10296,7 +10312,7 @@
               </a:ln>
               <a:extLst>
                 <a:ext uri="{91240B29-F687-4f45-9708-019B960494DF}">
-                  <a14:hiddenLine xmlns:a14="http://schemas.microsoft.com/office/drawing/2010/main" xmlns="" w="9525">
+                  <a14:hiddenLine xmlns="" xmlns:a14="http://schemas.microsoft.com/office/drawing/2010/main" w="9525">
                     <a:solidFill>
                       <a:srgbClr val="000000"/>
                     </a:solidFill>
@@ -10330,7 +10346,7 @@
               </a:ln>
               <a:extLst>
                 <a:ext uri="{91240B29-F687-4f45-9708-019B960494DF}">
-                  <a14:hiddenLine xmlns:a14="http://schemas.microsoft.com/office/drawing/2010/main" xmlns="" w="9525">
+                  <a14:hiddenLine xmlns="" xmlns:a14="http://schemas.microsoft.com/office/drawing/2010/main" w="9525">
                     <a:solidFill>
                       <a:srgbClr val="000000"/>
                     </a:solidFill>
@@ -10395,7 +10411,7 @@
               </a:ln>
               <a:extLst>
                 <a:ext uri="{91240B29-F687-4f45-9708-019B960494DF}">
-                  <a14:hiddenLine xmlns:a14="http://schemas.microsoft.com/office/drawing/2010/main" xmlns="" w="9525">
+                  <a14:hiddenLine xmlns="" xmlns:a14="http://schemas.microsoft.com/office/drawing/2010/main" w="9525">
                     <a:solidFill>
                       <a:srgbClr val="000000"/>
                     </a:solidFill>
@@ -10485,7 +10501,7 @@
               </a:ln>
               <a:extLst>
                 <a:ext uri="{91240B29-F687-4f45-9708-019B960494DF}">
-                  <a14:hiddenLine xmlns:a14="http://schemas.microsoft.com/office/drawing/2010/main" xmlns="" w="9525">
+                  <a14:hiddenLine xmlns="" xmlns:a14="http://schemas.microsoft.com/office/drawing/2010/main" w="9525">
                     <a:solidFill>
                       <a:srgbClr val="000000"/>
                     </a:solidFill>
@@ -10547,7 +10563,7 @@
               </a:ln>
               <a:extLst>
                 <a:ext uri="{91240B29-F687-4f45-9708-019B960494DF}">
-                  <a14:hiddenLine xmlns:a14="http://schemas.microsoft.com/office/drawing/2010/main" xmlns="" w="9525">
+                  <a14:hiddenLine xmlns="" xmlns:a14="http://schemas.microsoft.com/office/drawing/2010/main" w="9525">
                     <a:solidFill>
                       <a:srgbClr val="000000"/>
                     </a:solidFill>
@@ -10637,7 +10653,7 @@
               </a:ln>
               <a:extLst>
                 <a:ext uri="{91240B29-F687-4f45-9708-019B960494DF}">
-                  <a14:hiddenLine xmlns:a14="http://schemas.microsoft.com/office/drawing/2010/main" xmlns="" w="9525">
+                  <a14:hiddenLine xmlns="" xmlns:a14="http://schemas.microsoft.com/office/drawing/2010/main" w="9525">
                     <a:solidFill>
                       <a:srgbClr val="000000"/>
                     </a:solidFill>
@@ -10702,7 +10718,7 @@
               </a:ln>
               <a:extLst>
                 <a:ext uri="{91240B29-F687-4f45-9708-019B960494DF}">
-                  <a14:hiddenLine xmlns:a14="http://schemas.microsoft.com/office/drawing/2010/main" xmlns="" w="9525">
+                  <a14:hiddenLine xmlns="" xmlns:a14="http://schemas.microsoft.com/office/drawing/2010/main" w="9525">
                     <a:solidFill>
                       <a:srgbClr val="000000"/>
                     </a:solidFill>
@@ -10764,7 +10780,7 @@
               </a:ln>
               <a:extLst>
                 <a:ext uri="{91240B29-F687-4f45-9708-019B960494DF}">
-                  <a14:hiddenLine xmlns:a14="http://schemas.microsoft.com/office/drawing/2010/main" xmlns="" w="9525">
+                  <a14:hiddenLine xmlns="" xmlns:a14="http://schemas.microsoft.com/office/drawing/2010/main" w="9525">
                     <a:solidFill>
                       <a:srgbClr val="000000"/>
                     </a:solidFill>
@@ -10854,7 +10870,7 @@
               </a:ln>
               <a:extLst>
                 <a:ext uri="{91240B29-F687-4f45-9708-019B960494DF}">
-                  <a14:hiddenLine xmlns:a14="http://schemas.microsoft.com/office/drawing/2010/main" xmlns="" w="9525">
+                  <a14:hiddenLine xmlns="" xmlns:a14="http://schemas.microsoft.com/office/drawing/2010/main" w="9525">
                     <a:solidFill>
                       <a:srgbClr val="000000"/>
                     </a:solidFill>
@@ -10944,7 +10960,7 @@
               </a:ln>
               <a:extLst>
                 <a:ext uri="{91240B29-F687-4f45-9708-019B960494DF}">
-                  <a14:hiddenLine xmlns:a14="http://schemas.microsoft.com/office/drawing/2010/main" xmlns="" w="9525">
+                  <a14:hiddenLine xmlns="" xmlns:a14="http://schemas.microsoft.com/office/drawing/2010/main" w="9525">
                     <a:solidFill>
                       <a:srgbClr val="000000"/>
                     </a:solidFill>
@@ -11009,7 +11025,7 @@
               </a:ln>
               <a:extLst>
                 <a:ext uri="{91240B29-F687-4f45-9708-019B960494DF}">
-                  <a14:hiddenLine xmlns:a14="http://schemas.microsoft.com/office/drawing/2010/main" xmlns="" w="9525">
+                  <a14:hiddenLine xmlns="" xmlns:a14="http://schemas.microsoft.com/office/drawing/2010/main" w="9525">
                     <a:solidFill>
                       <a:srgbClr val="000000"/>
                     </a:solidFill>
@@ -11129,7 +11145,7 @@
               </a:ln>
               <a:extLst>
                 <a:ext uri="{91240B29-F687-4f45-9708-019B960494DF}">
-                  <a14:hiddenLine xmlns:a14="http://schemas.microsoft.com/office/drawing/2010/main" xmlns="" w="9525">
+                  <a14:hiddenLine xmlns="" xmlns:a14="http://schemas.microsoft.com/office/drawing/2010/main" w="9525">
                     <a:solidFill>
                       <a:srgbClr val="000000"/>
                     </a:solidFill>
@@ -11210,7 +11226,7 @@
               </a:ln>
               <a:extLst>
                 <a:ext uri="{91240B29-F687-4f45-9708-019B960494DF}">
-                  <a14:hiddenLine xmlns:a14="http://schemas.microsoft.com/office/drawing/2010/main" xmlns="" w="9525">
+                  <a14:hiddenLine xmlns="" xmlns:a14="http://schemas.microsoft.com/office/drawing/2010/main" w="9525">
                     <a:solidFill>
                       <a:srgbClr val="000000"/>
                     </a:solidFill>
@@ -11325,7 +11341,7 @@
               </a:ln>
               <a:extLst>
                 <a:ext uri="{91240B29-F687-4f45-9708-019B960494DF}">
-                  <a14:hiddenLine xmlns:a14="http://schemas.microsoft.com/office/drawing/2010/main" xmlns="" w="9525">
+                  <a14:hiddenLine xmlns="" xmlns:a14="http://schemas.microsoft.com/office/drawing/2010/main" w="9525">
                     <a:solidFill>
                       <a:srgbClr val="000000"/>
                     </a:solidFill>
@@ -11415,7 +11431,7 @@
               </a:ln>
               <a:extLst>
                 <a:ext uri="{91240B29-F687-4f45-9708-019B960494DF}">
-                  <a14:hiddenLine xmlns:a14="http://schemas.microsoft.com/office/drawing/2010/main" xmlns="" w="9525">
+                  <a14:hiddenLine xmlns="" xmlns:a14="http://schemas.microsoft.com/office/drawing/2010/main" w="9525">
                     <a:solidFill>
                       <a:srgbClr val="000000"/>
                     </a:solidFill>
@@ -11480,7 +11496,7 @@
               </a:ln>
               <a:extLst>
                 <a:ext uri="{91240B29-F687-4f45-9708-019B960494DF}">
-                  <a14:hiddenLine xmlns:a14="http://schemas.microsoft.com/office/drawing/2010/main" xmlns="" w="9525">
+                  <a14:hiddenLine xmlns="" xmlns:a14="http://schemas.microsoft.com/office/drawing/2010/main" w="9525">
                     <a:solidFill>
                       <a:srgbClr val="000000"/>
                     </a:solidFill>
@@ -11570,7 +11586,7 @@
               </a:ln>
               <a:extLst>
                 <a:ext uri="{91240B29-F687-4f45-9708-019B960494DF}">
-                  <a14:hiddenLine xmlns:a14="http://schemas.microsoft.com/office/drawing/2010/main" xmlns="" w="9525">
+                  <a14:hiddenLine xmlns="" xmlns:a14="http://schemas.microsoft.com/office/drawing/2010/main" w="9525">
                     <a:solidFill>
                       <a:srgbClr val="000000"/>
                     </a:solidFill>
@@ -11638,7 +11654,7 @@
               </a:ln>
               <a:extLst>
                 <a:ext uri="{91240B29-F687-4f45-9708-019B960494DF}">
-                  <a14:hiddenLine xmlns:a14="http://schemas.microsoft.com/office/drawing/2010/main" xmlns="" w="9525">
+                  <a14:hiddenLine xmlns="" xmlns:a14="http://schemas.microsoft.com/office/drawing/2010/main" w="9525">
                     <a:solidFill>
                       <a:srgbClr val="000000"/>
                     </a:solidFill>
@@ -11728,7 +11744,7 @@
               </a:ln>
               <a:extLst>
                 <a:ext uri="{91240B29-F687-4f45-9708-019B960494DF}">
-                  <a14:hiddenLine xmlns:a14="http://schemas.microsoft.com/office/drawing/2010/main" xmlns="" w="9525">
+                  <a14:hiddenLine xmlns="" xmlns:a14="http://schemas.microsoft.com/office/drawing/2010/main" w="9525">
                     <a:solidFill>
                       <a:srgbClr val="000000"/>
                     </a:solidFill>
@@ -11796,7 +11812,7 @@
               </a:ln>
               <a:extLst>
                 <a:ext uri="{91240B29-F687-4f45-9708-019B960494DF}">
-                  <a14:hiddenLine xmlns:a14="http://schemas.microsoft.com/office/drawing/2010/main" xmlns="" w="9525">
+                  <a14:hiddenLine xmlns="" xmlns:a14="http://schemas.microsoft.com/office/drawing/2010/main" w="9525">
                     <a:solidFill>
                       <a:srgbClr val="000000"/>
                     </a:solidFill>
@@ -11886,7 +11902,7 @@
               </a:ln>
               <a:extLst>
                 <a:ext uri="{91240B29-F687-4f45-9708-019B960494DF}">
-                  <a14:hiddenLine xmlns:a14="http://schemas.microsoft.com/office/drawing/2010/main" xmlns="" w="9525">
+                  <a14:hiddenLine xmlns="" xmlns:a14="http://schemas.microsoft.com/office/drawing/2010/main" w="9525">
                     <a:solidFill>
                       <a:srgbClr val="000000"/>
                     </a:solidFill>
@@ -11920,7 +11936,7 @@
               </a:ln>
               <a:extLst>
                 <a:ext uri="{91240B29-F687-4f45-9708-019B960494DF}">
-                  <a14:hiddenLine xmlns:a14="http://schemas.microsoft.com/office/drawing/2010/main" xmlns="" w="9525">
+                  <a14:hiddenLine xmlns="" xmlns:a14="http://schemas.microsoft.com/office/drawing/2010/main" w="9525">
                     <a:solidFill>
                       <a:srgbClr val="000000"/>
                     </a:solidFill>
@@ -12061,7 +12077,7 @@
             <a:fld id="{48A87A34-81AB-432B-8DAE-1953F412C126}" type="datetimeFigureOut">
               <a:rPr lang="en-US" dirty="0"/>
               <a:pPr/>
-              <a:t>8/29/18</a:t>
+              <a:t>9/6/2018</a:t>
             </a:fld>
             <a:endParaRPr lang="en-US" dirty="0"/>
           </a:p>
@@ -12528,7 +12544,7 @@
           <a:p>
             <a:r>
               <a:rPr lang="en-US" dirty="0"/>
-              <a:t>Supporting Linux Offerings in Azure App Service</a:t>
+              <a:t>Learning Linux and Docker for Anyone</a:t>
             </a:r>
           </a:p>
         </p:txBody>

</xml_diff>